<commit_message>
Update timings in scoping deck
</commit_message>
<xml_diff>
--- a/PPTs/000_Workshop_Scoping Call.pptx
+++ b/PPTs/000_Workshop_Scoping Call.pptx
@@ -5,21 +5,22 @@
     <p:sldMasterId id="2147484229" r:id="rId4"/>
   </p:sldMasterIdLst>
   <p:notesMasterIdLst>
-    <p:notesMasterId r:id="rId14"/>
+    <p:notesMasterId r:id="rId15"/>
   </p:notesMasterIdLst>
   <p:handoutMasterIdLst>
-    <p:handoutMasterId r:id="rId15"/>
+    <p:handoutMasterId r:id="rId16"/>
   </p:handoutMasterIdLst>
   <p:sldIdLst>
     <p:sldId id="2076138262" r:id="rId5"/>
     <p:sldId id="2076138431" r:id="rId6"/>
     <p:sldId id="2076138468" r:id="rId7"/>
     <p:sldId id="2076138329" r:id="rId8"/>
-    <p:sldId id="2076138359" r:id="rId9"/>
-    <p:sldId id="2076138465" r:id="rId10"/>
-    <p:sldId id="2076138467" r:id="rId11"/>
-    <p:sldId id="2076138466" r:id="rId12"/>
-    <p:sldId id="2076138365" r:id="rId13"/>
+    <p:sldId id="2076138469" r:id="rId9"/>
+    <p:sldId id="2076138359" r:id="rId10"/>
+    <p:sldId id="2076138465" r:id="rId11"/>
+    <p:sldId id="2076138467" r:id="rId12"/>
+    <p:sldId id="2076138466" r:id="rId13"/>
+    <p:sldId id="2076138365" r:id="rId14"/>
   </p:sldIdLst>
   <p:sldSz cx="12192000" cy="6858000"/>
   <p:notesSz cx="6858000" cy="9144000"/>
@@ -560,7 +561,7 @@
               <a:rPr lang="en-US" smtClean="0">
                 <a:latin typeface="Segoe UI" pitchFamily="34" charset="0"/>
               </a:rPr>
-              <a:t>6/23/2023 10:14 AM</a:t>
+              <a:t>6/27/2023 1:27 PM</a:t>
             </a:fld>
             <a:endParaRPr lang="en-US">
               <a:latin typeface="Segoe UI" pitchFamily="34" charset="0"/>
@@ -838,7 +839,7 @@
           <a:p>
             <a:fld id="{386CE63F-9E7F-4C04-9D0D-FCA25A8E9E86}" type="datetime8">
               <a:rPr lang="en-US" smtClean="0"/>
-              <a:t>6/23/2023 10:14 AM</a:t>
+              <a:t>6/27/2023 1:27 PM</a:t>
             </a:fld>
             <a:endParaRPr lang="en-US"/>
           </a:p>
@@ -1205,7 +1206,7 @@
           <a:p>
             <a:fld id="{62C61DAB-D93E-49CA-B245-379601CFE8D0}" type="datetime8">
               <a:rPr lang="en-US" smtClean="0"/>
-              <a:t>6/23/2023 10:14 AM</a:t>
+              <a:t>6/27/2023 1:27 PM</a:t>
             </a:fld>
             <a:endParaRPr lang="en-US"/>
           </a:p>
@@ -1370,7 +1371,7 @@
           <a:p>
             <a:fld id="{62C61DAB-D93E-49CA-B245-379601CFE8D0}" type="datetime8">
               <a:rPr lang="en-US" smtClean="0"/>
-              <a:t>6/23/2023 10:14 AM</a:t>
+              <a:t>6/27/2023 1:27 PM</a:t>
             </a:fld>
             <a:endParaRPr lang="en-US"/>
           </a:p>
@@ -1394,7 +1395,7 @@
             <a:fld id="{B4008EB6-D09E-4580-8CD6-DDB14511944F}" type="slidenum">
               <a:rPr lang="en-US" smtClean="0"/>
               <a:pPr/>
-              <a:t>9</a:t>
+              <a:t>10</a:t>
             </a:fld>
             <a:endParaRPr lang="en-US"/>
           </a:p>
@@ -55728,6 +55729,120 @@
 </p:sld>
 </file>
 
+<file path=ppt/slides/slide10.xml><?xml version="1.0" encoding="utf-8"?>
+<p:sld xmlns:a="http://schemas.openxmlformats.org/drawingml/2006/main" xmlns:r="http://schemas.openxmlformats.org/officeDocument/2006/relationships" xmlns:p="http://schemas.openxmlformats.org/presentationml/2006/main">
+  <p:cSld>
+    <p:spTree>
+      <p:nvGrpSpPr>
+        <p:cNvPr id="1" name=""/>
+        <p:cNvGrpSpPr/>
+        <p:nvPr/>
+      </p:nvGrpSpPr>
+      <p:grpSpPr>
+        <a:xfrm>
+          <a:off x="0" y="0"/>
+          <a:ext cx="0" cy="0"/>
+          <a:chOff x="0" y="0"/>
+          <a:chExt cx="0" cy="0"/>
+        </a:xfrm>
+      </p:grpSpPr>
+      <p:pic>
+        <p:nvPicPr>
+          <p:cNvPr id="3" name="Picture 2" descr="Sunset over low lying hills with a field in the foreground.">
+            <a:extLst>
+              <a:ext uri="{FF2B5EF4-FFF2-40B4-BE49-F238E27FC236}">
+                <a16:creationId xmlns:a16="http://schemas.microsoft.com/office/drawing/2014/main" id="{450FBF2A-33F5-5940-8634-26E039373A7C}"/>
+              </a:ext>
+            </a:extLst>
+          </p:cNvPr>
+          <p:cNvPicPr>
+            <a:picLocks noChangeAspect="1"/>
+          </p:cNvPicPr>
+          <p:nvPr/>
+        </p:nvPicPr>
+        <p:blipFill rotWithShape="1">
+          <a:blip r:embed="rId3"/>
+          <a:srcRect b="15741"/>
+          <a:stretch/>
+        </p:blipFill>
+        <p:spPr>
+          <a:xfrm>
+            <a:off x="0" y="-1"/>
+            <a:ext cx="12193571" cy="6858000"/>
+          </a:xfrm>
+          <a:prstGeom prst="rect">
+            <a:avLst/>
+          </a:prstGeom>
+        </p:spPr>
+      </p:pic>
+      <p:sp>
+        <p:nvSpPr>
+          <p:cNvPr id="4" name="Title 3"/>
+          <p:cNvSpPr>
+            <a:spLocks noGrp="1"/>
+          </p:cNvSpPr>
+          <p:nvPr>
+            <p:ph type="title"/>
+          </p:nvPr>
+        </p:nvSpPr>
+        <p:spPr/>
+        <p:txBody>
+          <a:bodyPr/>
+          <a:lstStyle/>
+          <a:p>
+            <a:r>
+              <a:rPr lang="en-US"/>
+              <a:t>Thank you</a:t>
+            </a:r>
+          </a:p>
+        </p:txBody>
+      </p:sp>
+      <p:pic>
+        <p:nvPicPr>
+          <p:cNvPr id="9" name="MS logo white - EMF" descr="Microsoft logo white text version">
+            <a:extLst>
+              <a:ext uri="{FF2B5EF4-FFF2-40B4-BE49-F238E27FC236}">
+                <a16:creationId xmlns:a16="http://schemas.microsoft.com/office/drawing/2014/main" id="{2D6D2EED-E1D0-E645-A601-6B33303FB49D}"/>
+              </a:ext>
+            </a:extLst>
+          </p:cNvPr>
+          <p:cNvPicPr>
+            <a:picLocks noChangeAspect="1"/>
+          </p:cNvPicPr>
+          <p:nvPr/>
+        </p:nvPicPr>
+        <p:blipFill>
+          <a:blip r:embed="rId4"/>
+          <a:stretch>
+            <a:fillRect/>
+          </a:stretch>
+        </p:blipFill>
+        <p:spPr bwMode="black">
+          <a:xfrm>
+            <a:off x="584200" y="585788"/>
+            <a:ext cx="1366245" cy="292608"/>
+          </a:xfrm>
+          <a:prstGeom prst="rect">
+            <a:avLst/>
+          </a:prstGeom>
+        </p:spPr>
+      </p:pic>
+    </p:spTree>
+    <p:extLst>
+      <p:ext uri="{BB962C8B-B14F-4D97-AF65-F5344CB8AC3E}">
+        <p14:creationId xmlns:p14="http://schemas.microsoft.com/office/powerpoint/2010/main" val="494854287"/>
+      </p:ext>
+    </p:extLst>
+  </p:cSld>
+  <p:clrMapOvr>
+    <a:masterClrMapping/>
+  </p:clrMapOvr>
+  <p:transition>
+    <p:fade/>
+  </p:transition>
+</p:sld>
+</file>
+
 <file path=ppt/slides/slide2.xml><?xml version="1.0" encoding="utf-8"?>
 <p:sld xmlns:a="http://schemas.openxmlformats.org/drawingml/2006/main" xmlns:r="http://schemas.openxmlformats.org/officeDocument/2006/relationships" xmlns:p="http://schemas.openxmlformats.org/presentationml/2006/main">
   <p:cSld>
@@ -57082,10 +57197,10 @@
       </p:grpSpPr>
       <p:sp>
         <p:nvSpPr>
-          <p:cNvPr id="2" name="Title 1">
-            <a:extLst>
-              <a:ext uri="{FF2B5EF4-FFF2-40B4-BE49-F238E27FC236}">
-                <a16:creationId xmlns:a16="http://schemas.microsoft.com/office/drawing/2014/main" id="{2731C5BF-2587-AA43-8D00-4B95D90A112D}"/>
+          <p:cNvPr id="4" name="Title 3">
+            <a:extLst>
+              <a:ext uri="{FF2B5EF4-FFF2-40B4-BE49-F238E27FC236}">
+                <a16:creationId xmlns:a16="http://schemas.microsoft.com/office/drawing/2014/main" id="{AA338D19-B6F7-5EE7-950C-3B8912832F34}"/>
               </a:ext>
             </a:extLst>
           </p:cNvPr>
@@ -57102,18 +57217,18 @@
           <a:lstStyle/>
           <a:p>
             <a:r>
-              <a:rPr lang="en-US"/>
-              <a:t>Dates, Attendees and Location</a:t>
-            </a:r>
-          </a:p>
-        </p:txBody>
-      </p:sp>
-      <p:sp>
-        <p:nvSpPr>
-          <p:cNvPr id="3" name="Text Placeholder 2">
-            <a:extLst>
-              <a:ext uri="{FF2B5EF4-FFF2-40B4-BE49-F238E27FC236}">
-                <a16:creationId xmlns:a16="http://schemas.microsoft.com/office/drawing/2014/main" id="{F39D18C1-892E-774C-A583-DD3BE9301A12}"/>
+              <a:rPr lang="en-GB" dirty="0"/>
+              <a:t>Timings</a:t>
+            </a:r>
+          </a:p>
+        </p:txBody>
+      </p:sp>
+      <p:sp>
+        <p:nvSpPr>
+          <p:cNvPr id="5" name="Text Placeholder 4">
+            <a:extLst>
+              <a:ext uri="{FF2B5EF4-FFF2-40B4-BE49-F238E27FC236}">
+                <a16:creationId xmlns:a16="http://schemas.microsoft.com/office/drawing/2014/main" id="{AA537217-6B05-A117-4C52-0B12662859AD}"/>
               </a:ext>
             </a:extLst>
           </p:cNvPr>
@@ -57129,65 +57244,467 @@
           <a:bodyPr/>
           <a:lstStyle/>
           <a:p>
-            <a:r>
-              <a:rPr lang="en-US" dirty="0"/>
-              <a:t>Dates: [Enter proposed date here]</a:t>
-            </a:r>
-          </a:p>
-          <a:p>
-            <a:endParaRPr lang="en-US" dirty="0"/>
-          </a:p>
-          <a:p>
-            <a:r>
-              <a:rPr lang="en-US" dirty="0"/>
-              <a:t>Attendees: </a:t>
-            </a:r>
-          </a:p>
-          <a:p>
-            <a:pPr lvl="1"/>
-            <a:r>
-              <a:rPr lang="en-US" dirty="0"/>
-              <a:t>[List proposed attendee teams]</a:t>
-            </a:r>
-          </a:p>
-          <a:p>
-            <a:pPr lvl="1"/>
-            <a:r>
-              <a:rPr lang="en-US" dirty="0"/>
-              <a:t>Others?</a:t>
-            </a:r>
-          </a:p>
-          <a:p>
-            <a:pPr lvl="1"/>
-            <a:r>
-              <a:rPr lang="en-US" dirty="0"/>
-              <a:t>How many in total?</a:t>
-            </a:r>
-          </a:p>
-          <a:p>
-            <a:pPr marL="228600" lvl="1" indent="0">
+            <a:pPr marL="0" indent="0">
+              <a:spcBef>
+                <a:spcPts val="100"/>
+              </a:spcBef>
+              <a:spcAft>
+                <a:spcPts val="100"/>
+              </a:spcAft>
               <a:buNone/>
             </a:pPr>
-            <a:endParaRPr lang="en-US" dirty="0"/>
-          </a:p>
-          <a:p>
-            <a:r>
-              <a:rPr lang="en-US" dirty="0"/>
-              <a:t>Location: [Enter proposed location or remote here]</a:t>
-            </a:r>
-          </a:p>
-          <a:p>
-            <a:endParaRPr lang="en-US" dirty="0"/>
-          </a:p>
-          <a:p>
-            <a:endParaRPr lang="en-US" dirty="0"/>
+            <a:r>
+              <a:rPr lang="en-GB" sz="1100" b="1" dirty="0"/>
+              <a:t>Day 1</a:t>
+            </a:r>
+          </a:p>
+          <a:p>
+            <a:pPr marL="0" indent="0">
+              <a:spcBef>
+                <a:spcPts val="100"/>
+              </a:spcBef>
+              <a:spcAft>
+                <a:spcPts val="100"/>
+              </a:spcAft>
+              <a:buNone/>
+            </a:pPr>
+            <a:r>
+              <a:rPr lang="en-GB" sz="1100" dirty="0"/>
+              <a:t>09:30 - 10:00 - Introduction</a:t>
+            </a:r>
+          </a:p>
+          <a:p>
+            <a:pPr marL="0" indent="0">
+              <a:spcBef>
+                <a:spcPts val="100"/>
+              </a:spcBef>
+              <a:spcAft>
+                <a:spcPts val="100"/>
+              </a:spcAft>
+              <a:buNone/>
+            </a:pPr>
+            <a:r>
+              <a:rPr lang="en-GB" sz="1100" dirty="0"/>
+              <a:t>10:00 - 10:30 - IAC Bigger Picture</a:t>
+            </a:r>
+          </a:p>
+          <a:p>
+            <a:pPr marL="0" indent="0">
+              <a:spcBef>
+                <a:spcPts val="100"/>
+              </a:spcBef>
+              <a:spcAft>
+                <a:spcPts val="100"/>
+              </a:spcAft>
+              <a:buNone/>
+            </a:pPr>
+            <a:r>
+              <a:rPr lang="en-GB" sz="1100" dirty="0">
+                <a:solidFill>
+                  <a:srgbClr val="107C10"/>
+                </a:solidFill>
+              </a:rPr>
+              <a:t>10:30 - 11:00 - Break</a:t>
+            </a:r>
+          </a:p>
+          <a:p>
+            <a:pPr marL="0" indent="0">
+              <a:spcBef>
+                <a:spcPts val="100"/>
+              </a:spcBef>
+              <a:spcAft>
+                <a:spcPts val="100"/>
+              </a:spcAft>
+              <a:buNone/>
+            </a:pPr>
+            <a:r>
+              <a:rPr lang="en-GB" sz="1100" dirty="0"/>
+              <a:t>11:00 - 11:30 - Core Workflow</a:t>
+            </a:r>
+          </a:p>
+          <a:p>
+            <a:pPr marL="0" indent="0">
+              <a:spcBef>
+                <a:spcPts val="100"/>
+              </a:spcBef>
+              <a:spcAft>
+                <a:spcPts val="100"/>
+              </a:spcAft>
+              <a:buNone/>
+            </a:pPr>
+            <a:r>
+              <a:rPr lang="en-GB" sz="1100" dirty="0"/>
+              <a:t>11:30 - 12:30 - Lab 1 and Lab 2</a:t>
+            </a:r>
+          </a:p>
+          <a:p>
+            <a:pPr marL="0" indent="0">
+              <a:spcBef>
+                <a:spcPts val="100"/>
+              </a:spcBef>
+              <a:spcAft>
+                <a:spcPts val="100"/>
+              </a:spcAft>
+              <a:buNone/>
+            </a:pPr>
+            <a:r>
+              <a:rPr lang="en-GB" sz="1100" dirty="0">
+                <a:solidFill>
+                  <a:srgbClr val="107C10"/>
+                </a:solidFill>
+              </a:rPr>
+              <a:t>12:30 - 13:30 - Lunch</a:t>
+            </a:r>
+          </a:p>
+          <a:p>
+            <a:pPr marL="0" indent="0">
+              <a:spcBef>
+                <a:spcPts val="100"/>
+              </a:spcBef>
+              <a:spcAft>
+                <a:spcPts val="100"/>
+              </a:spcAft>
+              <a:buNone/>
+            </a:pPr>
+            <a:r>
+              <a:rPr lang="en-GB" sz="1100" dirty="0"/>
+              <a:t>13:30 - 13:45 - Expressions and Functions Part 1 - Expressions</a:t>
+            </a:r>
+          </a:p>
+          <a:p>
+            <a:pPr marL="0" indent="0">
+              <a:spcBef>
+                <a:spcPts val="100"/>
+              </a:spcBef>
+              <a:spcAft>
+                <a:spcPts val="100"/>
+              </a:spcAft>
+              <a:buNone/>
+            </a:pPr>
+            <a:r>
+              <a:rPr lang="en-GB" sz="1100" dirty="0"/>
+              <a:t>13:45 - 14:00 - Lab 3 - Expressions</a:t>
+            </a:r>
+          </a:p>
+          <a:p>
+            <a:pPr marL="0" indent="0">
+              <a:spcBef>
+                <a:spcPts val="100"/>
+              </a:spcBef>
+              <a:spcAft>
+                <a:spcPts val="100"/>
+              </a:spcAft>
+              <a:buNone/>
+            </a:pPr>
+            <a:r>
+              <a:rPr lang="en-GB" sz="1100" dirty="0"/>
+              <a:t>14:00 - 14:15 - Expressions and Functions Part 2 - Functions</a:t>
+            </a:r>
+          </a:p>
+          <a:p>
+            <a:pPr marL="0" indent="0">
+              <a:spcBef>
+                <a:spcPts val="100"/>
+              </a:spcBef>
+              <a:spcAft>
+                <a:spcPts val="100"/>
+              </a:spcAft>
+              <a:buNone/>
+            </a:pPr>
+            <a:r>
+              <a:rPr lang="en-GB" sz="1100" dirty="0"/>
+              <a:t>14:15 - 14:30 - Lab 3 - Functions</a:t>
+            </a:r>
+          </a:p>
+          <a:p>
+            <a:pPr marL="0" indent="0">
+              <a:spcBef>
+                <a:spcPts val="100"/>
+              </a:spcBef>
+              <a:spcAft>
+                <a:spcPts val="100"/>
+              </a:spcAft>
+              <a:buNone/>
+            </a:pPr>
+            <a:r>
+              <a:rPr lang="en-GB" sz="1100" dirty="0">
+                <a:solidFill>
+                  <a:srgbClr val="107C10"/>
+                </a:solidFill>
+              </a:rPr>
+              <a:t>14:30 - 15:00 - Break</a:t>
+            </a:r>
+          </a:p>
+          <a:p>
+            <a:pPr marL="0" indent="0">
+              <a:spcBef>
+                <a:spcPts val="100"/>
+              </a:spcBef>
+              <a:spcAft>
+                <a:spcPts val="100"/>
+              </a:spcAft>
+              <a:buNone/>
+            </a:pPr>
+            <a:r>
+              <a:rPr lang="en-GB" sz="1100" dirty="0"/>
+              <a:t>15:00 - 15:30 - Lab 4 - Importing resources and using data sources</a:t>
+            </a:r>
+          </a:p>
+          <a:p>
+            <a:pPr marL="0" indent="0">
+              <a:spcBef>
+                <a:spcPts val="100"/>
+              </a:spcBef>
+              <a:spcAft>
+                <a:spcPts val="100"/>
+              </a:spcAft>
+              <a:buNone/>
+            </a:pPr>
+            <a:r>
+              <a:rPr lang="en-GB" sz="1100" dirty="0"/>
+              <a:t>15:30 - 15:45 - Dependencies and Modules - Part 1 Dependencies</a:t>
+            </a:r>
+          </a:p>
+          <a:p>
+            <a:pPr marL="0" indent="0">
+              <a:spcBef>
+                <a:spcPts val="100"/>
+              </a:spcBef>
+              <a:spcAft>
+                <a:spcPts val="100"/>
+              </a:spcAft>
+              <a:buNone/>
+            </a:pPr>
+            <a:r>
+              <a:rPr lang="en-GB" sz="1100" dirty="0"/>
+              <a:t>15:45 - 16:15 - Lab 5 - Dependencies</a:t>
+            </a:r>
+          </a:p>
+          <a:p>
+            <a:pPr marL="0" indent="0">
+              <a:spcBef>
+                <a:spcPts val="100"/>
+              </a:spcBef>
+              <a:spcAft>
+                <a:spcPts val="100"/>
+              </a:spcAft>
+              <a:buNone/>
+            </a:pPr>
+            <a:r>
+              <a:rPr lang="en-GB" sz="1100" dirty="0"/>
+              <a:t>16:15 - 17:00 - Dependencies and Modules - Part 2 Modules</a:t>
+            </a:r>
+          </a:p>
+          <a:p>
+            <a:pPr marL="0" indent="0">
+              <a:spcBef>
+                <a:spcPts val="100"/>
+              </a:spcBef>
+              <a:spcAft>
+                <a:spcPts val="100"/>
+              </a:spcAft>
+              <a:buNone/>
+            </a:pPr>
+            <a:endParaRPr lang="en-GB" sz="1100" dirty="0"/>
+          </a:p>
+          <a:p>
+            <a:pPr marL="0" indent="0">
+              <a:spcBef>
+                <a:spcPts val="100"/>
+              </a:spcBef>
+              <a:spcAft>
+                <a:spcPts val="100"/>
+              </a:spcAft>
+              <a:buNone/>
+            </a:pPr>
+            <a:r>
+              <a:rPr lang="en-GB" sz="1100" b="1" dirty="0"/>
+              <a:t>Day 2</a:t>
+            </a:r>
+          </a:p>
+          <a:p>
+            <a:pPr marL="0" indent="0">
+              <a:spcBef>
+                <a:spcPts val="100"/>
+              </a:spcBef>
+              <a:spcAft>
+                <a:spcPts val="100"/>
+              </a:spcAft>
+              <a:buNone/>
+            </a:pPr>
+            <a:r>
+              <a:rPr lang="en-GB" sz="1100" dirty="0"/>
+              <a:t>09:30 - 10:00 - Lab 6 - Modules</a:t>
+            </a:r>
+          </a:p>
+          <a:p>
+            <a:pPr marL="0" indent="0">
+              <a:spcBef>
+                <a:spcPts val="100"/>
+              </a:spcBef>
+              <a:spcAft>
+                <a:spcPts val="100"/>
+              </a:spcAft>
+              <a:buNone/>
+            </a:pPr>
+            <a:r>
+              <a:rPr lang="en-GB" sz="1100" dirty="0"/>
+              <a:t>10:00 - 10:15 - State Management and Provisioning - Part 1 Remote State</a:t>
+            </a:r>
+          </a:p>
+          <a:p>
+            <a:pPr marL="0" indent="0">
+              <a:spcBef>
+                <a:spcPts val="100"/>
+              </a:spcBef>
+              <a:spcAft>
+                <a:spcPts val="100"/>
+              </a:spcAft>
+              <a:buNone/>
+            </a:pPr>
+            <a:r>
+              <a:rPr lang="en-GB" sz="1100" dirty="0">
+                <a:solidFill>
+                  <a:srgbClr val="107C10"/>
+                </a:solidFill>
+              </a:rPr>
+              <a:t>10:15 - 10:45 - Break</a:t>
+            </a:r>
+          </a:p>
+          <a:p>
+            <a:pPr marL="0" indent="0">
+              <a:spcBef>
+                <a:spcPts val="100"/>
+              </a:spcBef>
+              <a:spcAft>
+                <a:spcPts val="100"/>
+              </a:spcAft>
+              <a:buNone/>
+            </a:pPr>
+            <a:r>
+              <a:rPr lang="en-GB" sz="1100" dirty="0"/>
+              <a:t>10:45 - 11:15 - Lab 7 - Remote state</a:t>
+            </a:r>
+          </a:p>
+          <a:p>
+            <a:pPr marL="0" indent="0">
+              <a:spcBef>
+                <a:spcPts val="100"/>
+              </a:spcBef>
+              <a:spcAft>
+                <a:spcPts val="100"/>
+              </a:spcAft>
+              <a:buNone/>
+            </a:pPr>
+            <a:r>
+              <a:rPr lang="en-GB" sz="1100" dirty="0"/>
+              <a:t>11:15 - 11:30 - State Management and Provisioning - Part 2 Workspaces</a:t>
+            </a:r>
+          </a:p>
+          <a:p>
+            <a:pPr marL="0" indent="0">
+              <a:spcBef>
+                <a:spcPts val="100"/>
+              </a:spcBef>
+              <a:spcAft>
+                <a:spcPts val="100"/>
+              </a:spcAft>
+              <a:buNone/>
+            </a:pPr>
+            <a:r>
+              <a:rPr lang="en-GB" sz="1100" dirty="0"/>
+              <a:t>11:30 - 11:45 - Lab 8.1 - Workspaces</a:t>
+            </a:r>
+          </a:p>
+          <a:p>
+            <a:pPr marL="0" indent="0">
+              <a:spcBef>
+                <a:spcPts val="100"/>
+              </a:spcBef>
+              <a:spcAft>
+                <a:spcPts val="100"/>
+              </a:spcAft>
+              <a:buNone/>
+            </a:pPr>
+            <a:r>
+              <a:rPr lang="en-GB" sz="1100" dirty="0"/>
+              <a:t>11:45 - 12:30 - Continuous Delivery</a:t>
+            </a:r>
+          </a:p>
+          <a:p>
+            <a:pPr marL="0" indent="0">
+              <a:spcBef>
+                <a:spcPts val="100"/>
+              </a:spcBef>
+              <a:spcAft>
+                <a:spcPts val="100"/>
+              </a:spcAft>
+              <a:buNone/>
+            </a:pPr>
+            <a:r>
+              <a:rPr lang="en-GB" sz="1100" dirty="0">
+                <a:solidFill>
+                  <a:srgbClr val="107C10"/>
+                </a:solidFill>
+              </a:rPr>
+              <a:t>12:30 - 13:30 - Lunch</a:t>
+            </a:r>
+          </a:p>
+          <a:p>
+            <a:pPr marL="0" indent="0">
+              <a:spcBef>
+                <a:spcPts val="100"/>
+              </a:spcBef>
+              <a:spcAft>
+                <a:spcPts val="100"/>
+              </a:spcAft>
+              <a:buNone/>
+            </a:pPr>
+            <a:r>
+              <a:rPr lang="en-GB" sz="1100" dirty="0"/>
+              <a:t>13:30 - 15:00 - Continuous Delivery Lab</a:t>
+            </a:r>
+          </a:p>
+          <a:p>
+            <a:pPr marL="0" indent="0">
+              <a:spcBef>
+                <a:spcPts val="100"/>
+              </a:spcBef>
+              <a:spcAft>
+                <a:spcPts val="100"/>
+              </a:spcAft>
+              <a:buNone/>
+            </a:pPr>
+            <a:r>
+              <a:rPr lang="en-GB" sz="1100" dirty="0">
+                <a:solidFill>
+                  <a:srgbClr val="107C10"/>
+                </a:solidFill>
+              </a:rPr>
+              <a:t>15:00 – 15:30 - Break</a:t>
+            </a:r>
+          </a:p>
+          <a:p>
+            <a:pPr marL="0" indent="0">
+              <a:spcBef>
+                <a:spcPts val="100"/>
+              </a:spcBef>
+              <a:spcAft>
+                <a:spcPts val="100"/>
+              </a:spcAft>
+              <a:buNone/>
+            </a:pPr>
+            <a:r>
+              <a:rPr lang="en-GB" sz="1100" dirty="0"/>
+              <a:t>15:30 - 17:00 - Other labs, Q&amp;A, deep dive into any subjects</a:t>
+            </a:r>
           </a:p>
         </p:txBody>
       </p:sp>
     </p:spTree>
     <p:extLst>
       <p:ext uri="{BB962C8B-B14F-4D97-AF65-F5344CB8AC3E}">
-        <p14:creationId xmlns:p14="http://schemas.microsoft.com/office/powerpoint/2010/main" val="3651112807"/>
+        <p14:creationId xmlns:p14="http://schemas.microsoft.com/office/powerpoint/2010/main" val="624095391"/>
       </p:ext>
     </p:extLst>
   </p:cSld>
@@ -57240,7 +57757,7 @@
           <a:p>
             <a:r>
               <a:rPr lang="en-US"/>
-              <a:t>Prerequisites</a:t>
+              <a:t>Dates, Attendees and Location</a:t>
             </a:r>
           </a:p>
         </p:txBody>
@@ -57267,179 +57784,64 @@
           <a:lstStyle/>
           <a:p>
             <a:r>
-              <a:rPr lang="en-US" sz="1800" dirty="0"/>
-              <a:t>Laptop with Windows, MacOS or Linux</a:t>
+              <a:rPr lang="en-US" dirty="0"/>
+              <a:t>Dates: [Enter proposed date here]</a:t>
+            </a:r>
+          </a:p>
+          <a:p>
+            <a:endParaRPr lang="en-US" dirty="0"/>
+          </a:p>
+          <a:p>
+            <a:r>
+              <a:rPr lang="en-US" dirty="0"/>
+              <a:t>Attendees: </a:t>
             </a:r>
           </a:p>
           <a:p>
             <a:pPr lvl="1"/>
             <a:r>
-              <a:rPr lang="en-US" sz="1000" dirty="0"/>
-              <a:t>Recommend using a Personal Laptop outside of the corporate network.</a:t>
+              <a:rPr lang="en-US" dirty="0"/>
+              <a:t>[List proposed attendee teams]</a:t>
             </a:r>
           </a:p>
           <a:p>
             <a:pPr lvl="1"/>
             <a:r>
-              <a:rPr lang="en-US" sz="1000" dirty="0"/>
-              <a:t>Must have privileges to install software (e.g. Terraform CLI).</a:t>
+              <a:rPr lang="en-US" dirty="0"/>
+              <a:t>Others?</a:t>
             </a:r>
           </a:p>
           <a:p>
             <a:pPr lvl="1"/>
             <a:r>
-              <a:rPr lang="en-US" sz="1000" dirty="0"/>
-              <a:t>Must have a modern browser with unrestricted internet access.</a:t>
+              <a:rPr lang="en-US" dirty="0"/>
+              <a:t>How many in total?</a:t>
             </a:r>
           </a:p>
           <a:p>
             <a:pPr marL="228600" lvl="1" indent="0">
               <a:buNone/>
             </a:pPr>
-            <a:endParaRPr lang="en-US" sz="1000" dirty="0"/>
-          </a:p>
-          <a:p>
-            <a:r>
-              <a:rPr lang="en-US" sz="1800" dirty="0"/>
-              <a:t>Sandbox Azure with Owner rights on the Subscription.</a:t>
-            </a:r>
-          </a:p>
-          <a:p>
-            <a:pPr lvl="1"/>
-            <a:r>
-              <a:rPr lang="en-US" sz="1000" dirty="0"/>
-              <a:t>Recommend using Azure Free Account: </a:t>
-            </a:r>
-            <a:r>
-              <a:rPr lang="en-GB" sz="1000" dirty="0">
-                <a:hlinkClick r:id="rId2"/>
-              </a:rPr>
-              <a:t>https://azure.microsoft.com/en-gb/free</a:t>
-            </a:r>
-            <a:endParaRPr lang="en-GB" sz="1000" dirty="0"/>
-          </a:p>
-          <a:p>
-            <a:pPr marL="228600" lvl="1" indent="0">
-              <a:buNone/>
-            </a:pPr>
-            <a:endParaRPr lang="en-US" sz="1000" dirty="0"/>
-          </a:p>
-          <a:p>
-            <a:r>
-              <a:rPr lang="en-US" sz="1800" dirty="0"/>
-              <a:t>GitHub Organization with full admin rights</a:t>
-            </a:r>
-          </a:p>
-          <a:p>
-            <a:pPr lvl="1"/>
-            <a:r>
-              <a:rPr lang="en-US" sz="1000" dirty="0"/>
-              <a:t>Recommend creating a free personal organization: </a:t>
-            </a:r>
-            <a:r>
-              <a:rPr lang="en-GB" sz="1000" dirty="0">
-                <a:hlinkClick r:id="rId3"/>
-              </a:rPr>
-              <a:t>https://github.com/organizations/plan</a:t>
-            </a:r>
-            <a:endParaRPr lang="en-GB" sz="1000" dirty="0"/>
-          </a:p>
-          <a:p>
-            <a:pPr marL="228600" lvl="1" indent="0">
-              <a:buNone/>
-            </a:pPr>
-            <a:endParaRPr lang="en-US" sz="1000" dirty="0"/>
-          </a:p>
-          <a:p>
-            <a:r>
-              <a:rPr lang="en-US" sz="1800" dirty="0"/>
-              <a:t>Visual Studio Code</a:t>
-            </a:r>
-          </a:p>
-          <a:p>
-            <a:pPr lvl="1"/>
-            <a:r>
-              <a:rPr lang="en-US" sz="1000" dirty="0"/>
-              <a:t>Download: </a:t>
-            </a:r>
-            <a:r>
-              <a:rPr lang="en-US" sz="1000" dirty="0">
-                <a:hlinkClick r:id="rId4"/>
-              </a:rPr>
-              <a:t>https://code.visualstudio.com/Download</a:t>
-            </a:r>
-            <a:endParaRPr lang="en-US" sz="1000" dirty="0"/>
-          </a:p>
-          <a:p>
-            <a:pPr marL="228600" lvl="1" indent="0">
-              <a:buNone/>
-            </a:pPr>
-            <a:endParaRPr lang="en-US" sz="1000" dirty="0"/>
-          </a:p>
-          <a:p>
-            <a:r>
-              <a:rPr lang="en-US" sz="1800" dirty="0"/>
-              <a:t>git CLI</a:t>
-            </a:r>
-          </a:p>
-          <a:p>
-            <a:pPr lvl="1"/>
-            <a:r>
-              <a:rPr lang="en-US" sz="1000" dirty="0"/>
-              <a:t>Download: </a:t>
-            </a:r>
-            <a:r>
-              <a:rPr lang="en-US" sz="1000" dirty="0">
-                <a:hlinkClick r:id="rId5"/>
-              </a:rPr>
-              <a:t>https://git-scm.com/downloads</a:t>
-            </a:r>
-            <a:endParaRPr lang="en-US" sz="1000" dirty="0"/>
-          </a:p>
-          <a:p>
-            <a:pPr marL="228600" lvl="1" indent="0">
-              <a:buNone/>
-            </a:pPr>
-            <a:endParaRPr lang="en-US" sz="1000" dirty="0"/>
-          </a:p>
-          <a:p>
-            <a:r>
-              <a:rPr lang="en-US" sz="1800" dirty="0"/>
-              <a:t>Azure CLI</a:t>
-            </a:r>
-          </a:p>
-          <a:p>
-            <a:pPr lvl="1"/>
-            <a:r>
-              <a:rPr lang="en-US" sz="1000" dirty="0"/>
-              <a:t>Install: </a:t>
-            </a:r>
-            <a:r>
-              <a:rPr lang="en-US" sz="1000" dirty="0">
-                <a:hlinkClick r:id="rId6"/>
-              </a:rPr>
-              <a:t>https://learn.microsoft.com/en-us/cli/azure/install-azure-cli</a:t>
-            </a:r>
-            <a:endParaRPr lang="en-US" sz="1000" dirty="0"/>
-          </a:p>
-          <a:p>
-            <a:pPr marL="228600" lvl="1" indent="0">
-              <a:buNone/>
-            </a:pPr>
-            <a:endParaRPr lang="en-US" sz="1000" dirty="0"/>
-          </a:p>
-          <a:p>
-            <a:pPr marL="0" indent="0">
-              <a:buNone/>
-            </a:pPr>
-            <a:endParaRPr lang="en-US" sz="1800" dirty="0"/>
+            <a:endParaRPr lang="en-US" dirty="0"/>
+          </a:p>
+          <a:p>
+            <a:r>
+              <a:rPr lang="en-US" dirty="0"/>
+              <a:t>Location: [Enter proposed location or remote here]</a:t>
+            </a:r>
+          </a:p>
+          <a:p>
+            <a:endParaRPr lang="en-US" dirty="0"/>
+          </a:p>
+          <a:p>
+            <a:endParaRPr lang="en-US" dirty="0"/>
           </a:p>
         </p:txBody>
       </p:sp>
     </p:spTree>
     <p:extLst>
       <p:ext uri="{BB962C8B-B14F-4D97-AF65-F5344CB8AC3E}">
-        <p14:creationId xmlns:p14="http://schemas.microsoft.com/office/powerpoint/2010/main" val="93432665"/>
+        <p14:creationId xmlns:p14="http://schemas.microsoft.com/office/powerpoint/2010/main" val="3651112807"/>
       </p:ext>
     </p:extLst>
   </p:cSld>
@@ -57492,7 +57894,7 @@
           <a:p>
             <a:r>
               <a:rPr lang="en-US"/>
-              <a:t>Q&amp;A</a:t>
+              <a:t>Prerequisites</a:t>
             </a:r>
           </a:p>
         </p:txBody>
@@ -57519,22 +57921,179 @@
           <a:lstStyle/>
           <a:p>
             <a:r>
-              <a:rPr lang="en-US"/>
-              <a:t>Any Questions?</a:t>
-            </a:r>
-          </a:p>
-          <a:p>
-            <a:endParaRPr lang="en-US"/>
-          </a:p>
-          <a:p>
-            <a:endParaRPr lang="en-US"/>
+              <a:rPr lang="en-US" sz="1800" dirty="0"/>
+              <a:t>Laptop with Windows, MacOS or Linux</a:t>
+            </a:r>
+          </a:p>
+          <a:p>
+            <a:pPr lvl="1"/>
+            <a:r>
+              <a:rPr lang="en-US" sz="1000" dirty="0"/>
+              <a:t>Recommend using a Personal Laptop outside of the corporate network.</a:t>
+            </a:r>
+          </a:p>
+          <a:p>
+            <a:pPr lvl="1"/>
+            <a:r>
+              <a:rPr lang="en-US" sz="1000" dirty="0"/>
+              <a:t>Must have privileges to install software (e.g. Terraform CLI).</a:t>
+            </a:r>
+          </a:p>
+          <a:p>
+            <a:pPr lvl="1"/>
+            <a:r>
+              <a:rPr lang="en-US" sz="1000" dirty="0"/>
+              <a:t>Must have a modern browser with unrestricted internet access.</a:t>
+            </a:r>
+          </a:p>
+          <a:p>
+            <a:pPr marL="228600" lvl="1" indent="0">
+              <a:buNone/>
+            </a:pPr>
+            <a:endParaRPr lang="en-US" sz="1000" dirty="0"/>
+          </a:p>
+          <a:p>
+            <a:r>
+              <a:rPr lang="en-US" sz="1800" dirty="0"/>
+              <a:t>Sandbox Azure with Owner rights on the Subscription.</a:t>
+            </a:r>
+          </a:p>
+          <a:p>
+            <a:pPr lvl="1"/>
+            <a:r>
+              <a:rPr lang="en-US" sz="1000" dirty="0"/>
+              <a:t>Recommend using Azure Free Account: </a:t>
+            </a:r>
+            <a:r>
+              <a:rPr lang="en-GB" sz="1000" dirty="0">
+                <a:hlinkClick r:id="rId2"/>
+              </a:rPr>
+              <a:t>https://azure.microsoft.com/en-gb/free</a:t>
+            </a:r>
+            <a:endParaRPr lang="en-GB" sz="1000" dirty="0"/>
+          </a:p>
+          <a:p>
+            <a:pPr marL="228600" lvl="1" indent="0">
+              <a:buNone/>
+            </a:pPr>
+            <a:endParaRPr lang="en-US" sz="1000" dirty="0"/>
+          </a:p>
+          <a:p>
+            <a:r>
+              <a:rPr lang="en-US" sz="1800" dirty="0"/>
+              <a:t>GitHub Organization with full admin rights</a:t>
+            </a:r>
+          </a:p>
+          <a:p>
+            <a:pPr lvl="1"/>
+            <a:r>
+              <a:rPr lang="en-US" sz="1000" dirty="0"/>
+              <a:t>Recommend creating a free personal organization: </a:t>
+            </a:r>
+            <a:r>
+              <a:rPr lang="en-GB" sz="1000" dirty="0">
+                <a:hlinkClick r:id="rId3"/>
+              </a:rPr>
+              <a:t>https://github.com/organizations/plan</a:t>
+            </a:r>
+            <a:endParaRPr lang="en-GB" sz="1000" dirty="0"/>
+          </a:p>
+          <a:p>
+            <a:pPr marL="228600" lvl="1" indent="0">
+              <a:buNone/>
+            </a:pPr>
+            <a:endParaRPr lang="en-US" sz="1000" dirty="0"/>
+          </a:p>
+          <a:p>
+            <a:r>
+              <a:rPr lang="en-US" sz="1800" dirty="0"/>
+              <a:t>Visual Studio Code</a:t>
+            </a:r>
+          </a:p>
+          <a:p>
+            <a:pPr lvl="1"/>
+            <a:r>
+              <a:rPr lang="en-US" sz="1000" dirty="0"/>
+              <a:t>Download: </a:t>
+            </a:r>
+            <a:r>
+              <a:rPr lang="en-US" sz="1000" dirty="0">
+                <a:hlinkClick r:id="rId4"/>
+              </a:rPr>
+              <a:t>https://code.visualstudio.com/Download</a:t>
+            </a:r>
+            <a:endParaRPr lang="en-US" sz="1000" dirty="0"/>
+          </a:p>
+          <a:p>
+            <a:pPr marL="228600" lvl="1" indent="0">
+              <a:buNone/>
+            </a:pPr>
+            <a:endParaRPr lang="en-US" sz="1000" dirty="0"/>
+          </a:p>
+          <a:p>
+            <a:r>
+              <a:rPr lang="en-US" sz="1800" dirty="0"/>
+              <a:t>git CLI</a:t>
+            </a:r>
+          </a:p>
+          <a:p>
+            <a:pPr lvl="1"/>
+            <a:r>
+              <a:rPr lang="en-US" sz="1000" dirty="0"/>
+              <a:t>Download: </a:t>
+            </a:r>
+            <a:r>
+              <a:rPr lang="en-US" sz="1000" dirty="0">
+                <a:hlinkClick r:id="rId5"/>
+              </a:rPr>
+              <a:t>https://git-scm.com/downloads</a:t>
+            </a:r>
+            <a:endParaRPr lang="en-US" sz="1000" dirty="0"/>
+          </a:p>
+          <a:p>
+            <a:pPr marL="228600" lvl="1" indent="0">
+              <a:buNone/>
+            </a:pPr>
+            <a:endParaRPr lang="en-US" sz="1000" dirty="0"/>
+          </a:p>
+          <a:p>
+            <a:r>
+              <a:rPr lang="en-US" sz="1800" dirty="0"/>
+              <a:t>Azure CLI</a:t>
+            </a:r>
+          </a:p>
+          <a:p>
+            <a:pPr lvl="1"/>
+            <a:r>
+              <a:rPr lang="en-US" sz="1000" dirty="0"/>
+              <a:t>Install: </a:t>
+            </a:r>
+            <a:r>
+              <a:rPr lang="en-US" sz="1000" dirty="0">
+                <a:hlinkClick r:id="rId6"/>
+              </a:rPr>
+              <a:t>https://learn.microsoft.com/en-us/cli/azure/install-azure-cli</a:t>
+            </a:r>
+            <a:endParaRPr lang="en-US" sz="1000" dirty="0"/>
+          </a:p>
+          <a:p>
+            <a:pPr marL="228600" lvl="1" indent="0">
+              <a:buNone/>
+            </a:pPr>
+            <a:endParaRPr lang="en-US" sz="1000" dirty="0"/>
+          </a:p>
+          <a:p>
+            <a:pPr marL="0" indent="0">
+              <a:buNone/>
+            </a:pPr>
+            <a:endParaRPr lang="en-US" sz="1800" dirty="0"/>
           </a:p>
         </p:txBody>
       </p:sp>
     </p:spTree>
     <p:extLst>
       <p:ext uri="{BB962C8B-B14F-4D97-AF65-F5344CB8AC3E}">
-        <p14:creationId xmlns:p14="http://schemas.microsoft.com/office/powerpoint/2010/main" val="321811699"/>
+        <p14:creationId xmlns:p14="http://schemas.microsoft.com/office/powerpoint/2010/main" val="93432665"/>
       </p:ext>
     </p:extLst>
   </p:cSld>
@@ -57587,7 +58146,7 @@
           <a:p>
             <a:r>
               <a:rPr lang="en-US"/>
-              <a:t>Actions / Follow Up</a:t>
+              <a:t>Q&amp;A</a:t>
             </a:r>
           </a:p>
         </p:txBody>
@@ -57615,7 +58174,7 @@
           <a:p>
             <a:r>
               <a:rPr lang="en-US"/>
-              <a:t>Review Actions.</a:t>
+              <a:t>Any Questions?</a:t>
             </a:r>
           </a:p>
           <a:p>
@@ -57629,7 +58188,7 @@
     </p:spTree>
     <p:extLst>
       <p:ext uri="{BB962C8B-B14F-4D97-AF65-F5344CB8AC3E}">
-        <p14:creationId xmlns:p14="http://schemas.microsoft.com/office/powerpoint/2010/main" val="2932864528"/>
+        <p14:creationId xmlns:p14="http://schemas.microsoft.com/office/powerpoint/2010/main" val="321811699"/>
       </p:ext>
     </p:extLst>
   </p:cSld>
@@ -57659,38 +58218,15 @@
           <a:chExt cx="0" cy="0"/>
         </a:xfrm>
       </p:grpSpPr>
-      <p:pic>
-        <p:nvPicPr>
-          <p:cNvPr id="3" name="Picture 2" descr="Sunset over low lying hills with a field in the foreground.">
-            <a:extLst>
-              <a:ext uri="{FF2B5EF4-FFF2-40B4-BE49-F238E27FC236}">
-                <a16:creationId xmlns:a16="http://schemas.microsoft.com/office/drawing/2014/main" id="{450FBF2A-33F5-5940-8634-26E039373A7C}"/>
-              </a:ext>
-            </a:extLst>
-          </p:cNvPr>
-          <p:cNvPicPr>
-            <a:picLocks noChangeAspect="1"/>
-          </p:cNvPicPr>
-          <p:nvPr/>
-        </p:nvPicPr>
-        <p:blipFill rotWithShape="1">
-          <a:blip r:embed="rId3"/>
-          <a:srcRect b="15741"/>
-          <a:stretch/>
-        </p:blipFill>
-        <p:spPr>
-          <a:xfrm>
-            <a:off x="0" y="-1"/>
-            <a:ext cx="12193571" cy="6858000"/>
-          </a:xfrm>
-          <a:prstGeom prst="rect">
-            <a:avLst/>
-          </a:prstGeom>
-        </p:spPr>
-      </p:pic>
-      <p:sp>
-        <p:nvSpPr>
-          <p:cNvPr id="4" name="Title 3"/>
+      <p:sp>
+        <p:nvSpPr>
+          <p:cNvPr id="2" name="Title 1">
+            <a:extLst>
+              <a:ext uri="{FF2B5EF4-FFF2-40B4-BE49-F238E27FC236}">
+                <a16:creationId xmlns:a16="http://schemas.microsoft.com/office/drawing/2014/main" id="{2731C5BF-2587-AA43-8D00-4B95D90A112D}"/>
+              </a:ext>
+            </a:extLst>
+          </p:cNvPr>
           <p:cNvSpPr>
             <a:spLocks noGrp="1"/>
           </p:cNvSpPr>
@@ -57705,45 +58241,49 @@
           <a:p>
             <a:r>
               <a:rPr lang="en-US"/>
-              <a:t>Thank you</a:t>
-            </a:r>
-          </a:p>
-        </p:txBody>
-      </p:sp>
-      <p:pic>
-        <p:nvPicPr>
-          <p:cNvPr id="9" name="MS logo white - EMF" descr="Microsoft logo white text version">
-            <a:extLst>
-              <a:ext uri="{FF2B5EF4-FFF2-40B4-BE49-F238E27FC236}">
-                <a16:creationId xmlns:a16="http://schemas.microsoft.com/office/drawing/2014/main" id="{2D6D2EED-E1D0-E645-A601-6B33303FB49D}"/>
-              </a:ext>
-            </a:extLst>
-          </p:cNvPr>
-          <p:cNvPicPr>
-            <a:picLocks noChangeAspect="1"/>
-          </p:cNvPicPr>
-          <p:nvPr/>
-        </p:nvPicPr>
-        <p:blipFill>
-          <a:blip r:embed="rId4"/>
-          <a:stretch>
-            <a:fillRect/>
-          </a:stretch>
-        </p:blipFill>
-        <p:spPr bwMode="black">
-          <a:xfrm>
-            <a:off x="584200" y="585788"/>
-            <a:ext cx="1366245" cy="292608"/>
-          </a:xfrm>
-          <a:prstGeom prst="rect">
-            <a:avLst/>
-          </a:prstGeom>
-        </p:spPr>
-      </p:pic>
+              <a:t>Actions / Follow Up</a:t>
+            </a:r>
+          </a:p>
+        </p:txBody>
+      </p:sp>
+      <p:sp>
+        <p:nvSpPr>
+          <p:cNvPr id="3" name="Text Placeholder 2">
+            <a:extLst>
+              <a:ext uri="{FF2B5EF4-FFF2-40B4-BE49-F238E27FC236}">
+                <a16:creationId xmlns:a16="http://schemas.microsoft.com/office/drawing/2014/main" id="{F39D18C1-892E-774C-A583-DD3BE9301A12}"/>
+              </a:ext>
+            </a:extLst>
+          </p:cNvPr>
+          <p:cNvSpPr>
+            <a:spLocks noGrp="1"/>
+          </p:cNvSpPr>
+          <p:nvPr>
+            <p:ph type="body" sz="quarter" idx="11"/>
+          </p:nvPr>
+        </p:nvSpPr>
+        <p:spPr/>
+        <p:txBody>
+          <a:bodyPr/>
+          <a:lstStyle/>
+          <a:p>
+            <a:r>
+              <a:rPr lang="en-US"/>
+              <a:t>Review Actions.</a:t>
+            </a:r>
+          </a:p>
+          <a:p>
+            <a:endParaRPr lang="en-US"/>
+          </a:p>
+          <a:p>
+            <a:endParaRPr lang="en-US"/>
+          </a:p>
+        </p:txBody>
+      </p:sp>
     </p:spTree>
     <p:extLst>
       <p:ext uri="{BB962C8B-B14F-4D97-AF65-F5344CB8AC3E}">
-        <p14:creationId xmlns:p14="http://schemas.microsoft.com/office/powerpoint/2010/main" val="494854287"/>
+        <p14:creationId xmlns:p14="http://schemas.microsoft.com/office/powerpoint/2010/main" val="2932864528"/>
       </p:ext>
     </p:extLst>
   </p:cSld>
@@ -58836,23 +59376,6 @@
 </file>
 
 <file path=customXml/item1.xml><?xml version="1.0" encoding="utf-8"?>
-<p:properties xmlns:p="http://schemas.microsoft.com/office/2006/metadata/properties" xmlns:xsi="http://www.w3.org/2001/XMLSchema-instance" xmlns:pc="http://schemas.microsoft.com/office/infopath/2007/PartnerControls">
-  <documentManagement>
-    <MediaServiceKeyPoints xmlns="17012f8d-dfee-46cb-a314-eed379f2338a" xsi:nil="true"/>
-  </documentManagement>
-</p:properties>
-</file>
-
-<file path=customXml/item2.xml><?xml version="1.0" encoding="utf-8"?>
-<?mso-contentType ?>
-<FormTemplates xmlns="http://schemas.microsoft.com/sharepoint/v3/contenttype/forms">
-  <Display>DocumentLibraryForm</Display>
-  <Edit>DocumentLibraryForm</Edit>
-  <New>DocumentLibraryForm</New>
-</FormTemplates>
-</file>
-
-<file path=customXml/item3.xml><?xml version="1.0" encoding="utf-8"?>
 <ct:contentTypeSchema xmlns:ct="http://schemas.microsoft.com/office/2006/metadata/contentType" xmlns:ma="http://schemas.microsoft.com/office/2006/metadata/properties/metaAttributes" ct:_="" ma:_="" ma:contentTypeName="Document" ma:contentTypeID="0x0101004F24400607199A40B33B787452AC6853" ma:contentTypeVersion="6" ma:contentTypeDescription="Create a new document." ma:contentTypeScope="" ma:versionID="a196007bb08aa323bb23aeee550315c7">
   <xsd:schema xmlns:xsd="http://www.w3.org/2001/XMLSchema" xmlns:xs="http://www.w3.org/2001/XMLSchema" xmlns:p="http://schemas.microsoft.com/office/2006/metadata/properties" xmlns:ns2="f784ab01-3b00-4499-a3fe-88ca86405c7b" xmlns:ns3="17012f8d-dfee-46cb-a314-eed379f2338a" targetNamespace="http://schemas.microsoft.com/office/2006/metadata/properties" ma:root="true" ma:fieldsID="3d242837d6c3808c5f6bc9c4629a650d" ns2:_="" ns3:_="">
     <xsd:import namespace="f784ab01-3b00-4499-a3fe-88ca86405c7b"/>
@@ -59031,25 +59554,24 @@
 </ct:contentTypeSchema>
 </file>
 
-<file path=customXml/itemProps1.xml><?xml version="1.0" encoding="utf-8"?>
-<ds:datastoreItem xmlns:ds="http://schemas.openxmlformats.org/officeDocument/2006/customXml" ds:itemID="{561B1131-15CA-429C-B875-56F79CD6C674}">
-  <ds:schemaRefs>
-    <ds:schemaRef ds:uri="17012f8d-dfee-46cb-a314-eed379f2338a"/>
-    <ds:schemaRef ds:uri="http://schemas.microsoft.com/office/2006/metadata/properties"/>
-    <ds:schemaRef ds:uri="http://schemas.microsoft.com/office/infopath/2007/PartnerControls"/>
-  </ds:schemaRefs>
-</ds:datastoreItem>
+<file path=customXml/item2.xml><?xml version="1.0" encoding="utf-8"?>
+<?mso-contentType ?>
+<FormTemplates xmlns="http://schemas.microsoft.com/sharepoint/v3/contenttype/forms">
+  <Display>DocumentLibraryForm</Display>
+  <Edit>DocumentLibraryForm</Edit>
+  <New>DocumentLibraryForm</New>
+</FormTemplates>
 </file>
 
-<file path=customXml/itemProps2.xml><?xml version="1.0" encoding="utf-8"?>
-<ds:datastoreItem xmlns:ds="http://schemas.openxmlformats.org/officeDocument/2006/customXml" ds:itemID="{80773F8E-CD3C-401D-81D0-68F54DCC798C}">
-  <ds:schemaRefs>
-    <ds:schemaRef ds:uri="http://schemas.microsoft.com/sharepoint/v3/contenttype/forms"/>
-  </ds:schemaRefs>
-</ds:datastoreItem>
+<file path=customXml/item3.xml><?xml version="1.0" encoding="utf-8"?>
+<p:properties xmlns:p="http://schemas.microsoft.com/office/2006/metadata/properties" xmlns:xsi="http://www.w3.org/2001/XMLSchema-instance" xmlns:pc="http://schemas.microsoft.com/office/infopath/2007/PartnerControls">
+  <documentManagement>
+    <MediaServiceKeyPoints xmlns="17012f8d-dfee-46cb-a314-eed379f2338a" xsi:nil="true"/>
+  </documentManagement>
+</p:properties>
 </file>
 
-<file path=customXml/itemProps3.xml><?xml version="1.0" encoding="utf-8"?>
+<file path=customXml/itemProps1.xml><?xml version="1.0" encoding="utf-8"?>
 <ds:datastoreItem xmlns:ds="http://schemas.openxmlformats.org/officeDocument/2006/customXml" ds:itemID="{26C562AE-EF75-43EC-BCAC-878A15962DB7}">
   <ds:schemaRefs>
     <ds:schemaRef ds:uri="17012f8d-dfee-46cb-a314-eed379f2338a"/>
@@ -59068,6 +59590,24 @@
 </ds:datastoreItem>
 </file>
 
+<file path=customXml/itemProps2.xml><?xml version="1.0" encoding="utf-8"?>
+<ds:datastoreItem xmlns:ds="http://schemas.openxmlformats.org/officeDocument/2006/customXml" ds:itemID="{80773F8E-CD3C-401D-81D0-68F54DCC798C}">
+  <ds:schemaRefs>
+    <ds:schemaRef ds:uri="http://schemas.microsoft.com/sharepoint/v3/contenttype/forms"/>
+  </ds:schemaRefs>
+</ds:datastoreItem>
+</file>
+
+<file path=customXml/itemProps3.xml><?xml version="1.0" encoding="utf-8"?>
+<ds:datastoreItem xmlns:ds="http://schemas.openxmlformats.org/officeDocument/2006/customXml" ds:itemID="{561B1131-15CA-429C-B875-56F79CD6C674}">
+  <ds:schemaRefs>
+    <ds:schemaRef ds:uri="17012f8d-dfee-46cb-a314-eed379f2338a"/>
+    <ds:schemaRef ds:uri="http://schemas.microsoft.com/office/2006/metadata/properties"/>
+    <ds:schemaRef ds:uri="http://schemas.microsoft.com/office/infopath/2007/PartnerControls"/>
+  </ds:schemaRefs>
+</ds:datastoreItem>
+</file>
+
 <file path=docMetadata/LabelInfo.xml><?xml version="1.0" encoding="utf-8"?>
 <clbl:labelList xmlns:clbl="http://schemas.microsoft.com/office/2020/mipLabelMetadata">
   <clbl:label id="{f42aa342-8706-4288-bd11-ebb85995028c}" enabled="1" method="Standard" siteId="{72f988bf-86f1-41af-91ab-2d7cd011db47}" contentBits="0" removed="0"/>

</xml_diff>